<commit_message>
new logo added to slide
</commit_message>
<xml_diff>
--- a/docs/Shrello_Product_Deck_v4.0.pptx
+++ b/docs/Shrello_Product_Deck_v4.0.pptx
@@ -302,7 +302,7 @@
                 </a:solidFill>
               </a:rPr>
               <a:pPr/>
-              <a:t>16-08-2016</a:t>
+              <a:t>19-08-2016</a:t>
             </a:fld>
             <a:endParaRPr lang="en-IN">
               <a:solidFill>
@@ -378,7 +378,7 @@
     </p:spTree>
     <p:extLst>
       <p:ext uri="{BB962C8B-B14F-4D97-AF65-F5344CB8AC3E}">
-        <p14:creationId xmlns:p14="http://schemas.microsoft.com/office/powerpoint/2010/main" val="3061626799"/>
+        <p14:creationId xmlns:p14="http://schemas.microsoft.com/office/powerpoint/2010/main" xmlns="" val="3061626799"/>
       </p:ext>
     </p:extLst>
   </p:cSld>
@@ -504,7 +504,7 @@
                 </a:solidFill>
               </a:rPr>
               <a:pPr/>
-              <a:t>16-08-2016</a:t>
+              <a:t>19-08-2016</a:t>
             </a:fld>
             <a:endParaRPr lang="en-IN">
               <a:solidFill>
@@ -580,7 +580,7 @@
     </p:spTree>
     <p:extLst>
       <p:ext uri="{BB962C8B-B14F-4D97-AF65-F5344CB8AC3E}">
-        <p14:creationId xmlns:p14="http://schemas.microsoft.com/office/powerpoint/2010/main" val="2941465886"/>
+        <p14:creationId xmlns:p14="http://schemas.microsoft.com/office/powerpoint/2010/main" xmlns="" val="2941465886"/>
       </p:ext>
     </p:extLst>
   </p:cSld>
@@ -716,7 +716,7 @@
                 </a:solidFill>
               </a:rPr>
               <a:pPr/>
-              <a:t>16-08-2016</a:t>
+              <a:t>19-08-2016</a:t>
             </a:fld>
             <a:endParaRPr lang="en-IN">
               <a:solidFill>
@@ -792,7 +792,7 @@
     </p:spTree>
     <p:extLst>
       <p:ext uri="{BB962C8B-B14F-4D97-AF65-F5344CB8AC3E}">
-        <p14:creationId xmlns:p14="http://schemas.microsoft.com/office/powerpoint/2010/main" val="1833073894"/>
+        <p14:creationId xmlns:p14="http://schemas.microsoft.com/office/powerpoint/2010/main" xmlns="" val="1833073894"/>
       </p:ext>
     </p:extLst>
   </p:cSld>
@@ -918,7 +918,7 @@
                 </a:solidFill>
               </a:rPr>
               <a:pPr/>
-              <a:t>16-08-2016</a:t>
+              <a:t>19-08-2016</a:t>
             </a:fld>
             <a:endParaRPr lang="en-IN">
               <a:solidFill>
@@ -994,7 +994,7 @@
     </p:spTree>
     <p:extLst>
       <p:ext uri="{BB962C8B-B14F-4D97-AF65-F5344CB8AC3E}">
-        <p14:creationId xmlns:p14="http://schemas.microsoft.com/office/powerpoint/2010/main" val="3215960360"/>
+        <p14:creationId xmlns:p14="http://schemas.microsoft.com/office/powerpoint/2010/main" xmlns="" val="3215960360"/>
       </p:ext>
     </p:extLst>
   </p:cSld>
@@ -1196,7 +1196,7 @@
                 </a:solidFill>
               </a:rPr>
               <a:pPr/>
-              <a:t>16-08-2016</a:t>
+              <a:t>19-08-2016</a:t>
             </a:fld>
             <a:endParaRPr lang="en-IN">
               <a:solidFill>
@@ -1272,7 +1272,7 @@
     </p:spTree>
     <p:extLst>
       <p:ext uri="{BB962C8B-B14F-4D97-AF65-F5344CB8AC3E}">
-        <p14:creationId xmlns:p14="http://schemas.microsoft.com/office/powerpoint/2010/main" val="2164156959"/>
+        <p14:creationId xmlns:p14="http://schemas.microsoft.com/office/powerpoint/2010/main" xmlns="" val="2164156959"/>
       </p:ext>
     </p:extLst>
   </p:cSld>
@@ -1516,7 +1516,7 @@
                 </a:solidFill>
               </a:rPr>
               <a:pPr/>
-              <a:t>16-08-2016</a:t>
+              <a:t>19-08-2016</a:t>
             </a:fld>
             <a:endParaRPr lang="en-IN">
               <a:solidFill>
@@ -1592,7 +1592,7 @@
     </p:spTree>
     <p:extLst>
       <p:ext uri="{BB962C8B-B14F-4D97-AF65-F5344CB8AC3E}">
-        <p14:creationId xmlns:p14="http://schemas.microsoft.com/office/powerpoint/2010/main" val="2793910461"/>
+        <p14:creationId xmlns:p14="http://schemas.microsoft.com/office/powerpoint/2010/main" xmlns="" val="2793910461"/>
       </p:ext>
     </p:extLst>
   </p:cSld>
@@ -1970,7 +1970,7 @@
                 </a:solidFill>
               </a:rPr>
               <a:pPr/>
-              <a:t>16-08-2016</a:t>
+              <a:t>19-08-2016</a:t>
             </a:fld>
             <a:endParaRPr lang="en-IN">
               <a:solidFill>
@@ -2046,7 +2046,7 @@
     </p:spTree>
     <p:extLst>
       <p:ext uri="{BB962C8B-B14F-4D97-AF65-F5344CB8AC3E}">
-        <p14:creationId xmlns:p14="http://schemas.microsoft.com/office/powerpoint/2010/main" val="3029445848"/>
+        <p14:creationId xmlns:p14="http://schemas.microsoft.com/office/powerpoint/2010/main" xmlns="" val="3029445848"/>
       </p:ext>
     </p:extLst>
   </p:cSld>
@@ -2120,7 +2120,7 @@
                 </a:solidFill>
               </a:rPr>
               <a:pPr/>
-              <a:t>16-08-2016</a:t>
+              <a:t>19-08-2016</a:t>
             </a:fld>
             <a:endParaRPr lang="en-IN">
               <a:solidFill>
@@ -2196,7 +2196,7 @@
     </p:spTree>
     <p:extLst>
       <p:ext uri="{BB962C8B-B14F-4D97-AF65-F5344CB8AC3E}">
-        <p14:creationId xmlns:p14="http://schemas.microsoft.com/office/powerpoint/2010/main" val="3599363319"/>
+        <p14:creationId xmlns:p14="http://schemas.microsoft.com/office/powerpoint/2010/main" xmlns="" val="3599363319"/>
       </p:ext>
     </p:extLst>
   </p:cSld>
@@ -2247,7 +2247,7 @@
                 </a:solidFill>
               </a:rPr>
               <a:pPr/>
-              <a:t>16-08-2016</a:t>
+              <a:t>19-08-2016</a:t>
             </a:fld>
             <a:endParaRPr lang="en-IN">
               <a:solidFill>
@@ -2323,7 +2323,7 @@
     </p:spTree>
     <p:extLst>
       <p:ext uri="{BB962C8B-B14F-4D97-AF65-F5344CB8AC3E}">
-        <p14:creationId xmlns:p14="http://schemas.microsoft.com/office/powerpoint/2010/main" val="3487684615"/>
+        <p14:creationId xmlns:p14="http://schemas.microsoft.com/office/powerpoint/2010/main" xmlns="" val="3487684615"/>
       </p:ext>
     </p:extLst>
   </p:cSld>
@@ -2556,7 +2556,7 @@
                 </a:solidFill>
               </a:rPr>
               <a:pPr/>
-              <a:t>16-08-2016</a:t>
+              <a:t>19-08-2016</a:t>
             </a:fld>
             <a:endParaRPr lang="en-IN">
               <a:solidFill>
@@ -2632,7 +2632,7 @@
     </p:spTree>
     <p:extLst>
       <p:ext uri="{BB962C8B-B14F-4D97-AF65-F5344CB8AC3E}">
-        <p14:creationId xmlns:p14="http://schemas.microsoft.com/office/powerpoint/2010/main" val="3020662830"/>
+        <p14:creationId xmlns:p14="http://schemas.microsoft.com/office/powerpoint/2010/main" xmlns="" val="3020662830"/>
       </p:ext>
     </p:extLst>
   </p:cSld>
@@ -2841,7 +2841,7 @@
                 </a:solidFill>
               </a:rPr>
               <a:pPr/>
-              <a:t>16-08-2016</a:t>
+              <a:t>19-08-2016</a:t>
             </a:fld>
             <a:endParaRPr lang="en-IN">
               <a:solidFill>
@@ -2917,7 +2917,7 @@
     </p:spTree>
     <p:extLst>
       <p:ext uri="{BB962C8B-B14F-4D97-AF65-F5344CB8AC3E}">
-        <p14:creationId xmlns:p14="http://schemas.microsoft.com/office/powerpoint/2010/main" val="1254201710"/>
+        <p14:creationId xmlns:p14="http://schemas.microsoft.com/office/powerpoint/2010/main" xmlns="" val="1254201710"/>
       </p:ext>
     </p:extLst>
   </p:cSld>
@@ -3095,7 +3095,7 @@
                 </a:solidFill>
               </a:rPr>
               <a:pPr/>
-              <a:t>16-08-2016</a:t>
+              <a:t>19-08-2016</a:t>
             </a:fld>
             <a:endParaRPr lang="en-IN">
               <a:solidFill>
@@ -3207,7 +3207,7 @@
     </p:spTree>
     <p:extLst>
       <p:ext uri="{BB962C8B-B14F-4D97-AF65-F5344CB8AC3E}">
-        <p14:creationId xmlns:p14="http://schemas.microsoft.com/office/powerpoint/2010/main" val="1801550125"/>
+        <p14:creationId xmlns:p14="http://schemas.microsoft.com/office/powerpoint/2010/main" xmlns="" val="1801550125"/>
       </p:ext>
     </p:extLst>
   </p:cSld>
@@ -3497,20 +3497,14 @@
       </p:grpSpPr>
       <p:pic>
         <p:nvPicPr>
-          <p:cNvPr id="2050" name="Picture 2" descr="G:\front-2.png"/>
+          <p:cNvPr id="1026" name="Picture 2" descr="C:\Users\sid\Desktop\logo-new.png"/>
           <p:cNvPicPr>
             <a:picLocks noChangeAspect="1" noChangeArrowheads="1"/>
           </p:cNvPicPr>
           <p:nvPr/>
         </p:nvPicPr>
         <p:blipFill>
-          <a:blip r:embed="rId2">
-            <a:extLst>
-              <a:ext uri="{28A0092B-C50C-407E-A947-70E740481C1C}">
-                <a14:useLocalDpi xmlns:a14="http://schemas.microsoft.com/office/drawing/2010/main" val="0"/>
-              </a:ext>
-            </a:extLst>
-          </a:blip>
+          <a:blip r:embed="rId2"/>
           <a:srcRect/>
           <a:stretch>
             <a:fillRect/>
@@ -3518,28 +3512,19 @@
         </p:blipFill>
         <p:spPr bwMode="auto">
           <a:xfrm>
-            <a:off x="426574" y="937893"/>
-            <a:ext cx="8531486" cy="4874500"/>
+            <a:off x="1447800" y="1524000"/>
+            <a:ext cx="6858000" cy="3429000"/>
           </a:xfrm>
           <a:prstGeom prst="rect">
             <a:avLst/>
           </a:prstGeom>
           <a:noFill/>
-          <a:extLst>
-            <a:ext uri="{909E8E84-426E-40DD-AFC4-6F175D3DCCD1}">
-              <a14:hiddenFill xmlns:a14="http://schemas.microsoft.com/office/drawing/2010/main">
-                <a:solidFill>
-                  <a:srgbClr val="FFFFFF"/>
-                </a:solidFill>
-              </a14:hiddenFill>
-            </a:ext>
-          </a:extLst>
         </p:spPr>
       </p:pic>
     </p:spTree>
     <p:extLst>
       <p:ext uri="{BB962C8B-B14F-4D97-AF65-F5344CB8AC3E}">
-        <p14:creationId xmlns:p14="http://schemas.microsoft.com/office/powerpoint/2010/main" val="3924322579"/>
+        <p14:creationId xmlns:p14="http://schemas.microsoft.com/office/powerpoint/2010/main" xmlns="" val="3924322579"/>
       </p:ext>
     </p:extLst>
   </p:cSld>
@@ -3585,7 +3570,7 @@
           <a:blip r:embed="rId2">
             <a:extLst>
               <a:ext uri="{28A0092B-C50C-407E-A947-70E740481C1C}">
-                <a14:useLocalDpi xmlns:a14="http://schemas.microsoft.com/office/drawing/2010/main" val="0"/>
+                <a14:useLocalDpi xmlns:a14="http://schemas.microsoft.com/office/drawing/2010/main" xmlns="" val="0"/>
               </a:ext>
             </a:extLst>
           </a:blip>
@@ -3605,7 +3590,7 @@
           <a:noFill/>
           <a:extLst>
             <a:ext uri="{909E8E84-426E-40DD-AFC4-6F175D3DCCD1}">
-              <a14:hiddenFill xmlns:a14="http://schemas.microsoft.com/office/drawing/2010/main">
+              <a14:hiddenFill xmlns:a14="http://schemas.microsoft.com/office/drawing/2010/main" xmlns="">
                 <a:solidFill>
                   <a:srgbClr val="FFFFFF"/>
                 </a:solidFill>
@@ -3718,7 +3703,7 @@
           <a:blip r:embed="rId3">
             <a:extLst>
               <a:ext uri="{28A0092B-C50C-407E-A947-70E740481C1C}">
-                <a14:useLocalDpi xmlns:a14="http://schemas.microsoft.com/office/drawing/2010/main" val="0"/>
+                <a14:useLocalDpi xmlns:a14="http://schemas.microsoft.com/office/drawing/2010/main" xmlns="" val="0"/>
               </a:ext>
             </a:extLst>
           </a:blip>
@@ -3742,14 +3727,14 @@
           <a:effectLst/>
           <a:extLst>
             <a:ext uri="{909E8E84-426E-40DD-AFC4-6F175D3DCCD1}">
-              <a14:hiddenFill xmlns:a14="http://schemas.microsoft.com/office/drawing/2010/main">
+              <a14:hiddenFill xmlns:a14="http://schemas.microsoft.com/office/drawing/2010/main" xmlns="">
                 <a:solidFill>
                   <a:schemeClr val="accent1"/>
                 </a:solidFill>
               </a14:hiddenFill>
             </a:ext>
             <a:ext uri="{91240B29-F687-4F45-9708-019B960494DF}">
-              <a14:hiddenLine xmlns:a14="http://schemas.microsoft.com/office/drawing/2010/main" w="9525">
+              <a14:hiddenLine xmlns:a14="http://schemas.microsoft.com/office/drawing/2010/main" xmlns="" w="9525">
                 <a:solidFill>
                   <a:schemeClr val="tx1"/>
                 </a:solidFill>
@@ -3759,7 +3744,7 @@
               </a14:hiddenLine>
             </a:ext>
             <a:ext uri="{AF507438-7753-43E0-B8FC-AC1667EBCBE1}">
-              <a14:hiddenEffects xmlns:a14="http://schemas.microsoft.com/office/drawing/2010/main">
+              <a14:hiddenEffects xmlns:a14="http://schemas.microsoft.com/office/drawing/2010/main" xmlns="">
                 <a:effectLst>
                   <a:outerShdw dist="35921" dir="2700000" algn="ctr" rotWithShape="0">
                     <a:schemeClr val="bg2"/>
@@ -3782,7 +3767,7 @@
           <a:blip r:embed="rId4">
             <a:extLst>
               <a:ext uri="{28A0092B-C50C-407E-A947-70E740481C1C}">
-                <a14:useLocalDpi xmlns:a14="http://schemas.microsoft.com/office/drawing/2010/main" val="0"/>
+                <a14:useLocalDpi xmlns:a14="http://schemas.microsoft.com/office/drawing/2010/main" xmlns="" val="0"/>
               </a:ext>
             </a:extLst>
           </a:blip>
@@ -3806,14 +3791,14 @@
           <a:effectLst/>
           <a:extLst>
             <a:ext uri="{909E8E84-426E-40DD-AFC4-6F175D3DCCD1}">
-              <a14:hiddenFill xmlns:a14="http://schemas.microsoft.com/office/drawing/2010/main">
+              <a14:hiddenFill xmlns:a14="http://schemas.microsoft.com/office/drawing/2010/main" xmlns="">
                 <a:solidFill>
                   <a:schemeClr val="accent1"/>
                 </a:solidFill>
               </a14:hiddenFill>
             </a:ext>
             <a:ext uri="{91240B29-F687-4F45-9708-019B960494DF}">
-              <a14:hiddenLine xmlns:a14="http://schemas.microsoft.com/office/drawing/2010/main" w="9525">
+              <a14:hiddenLine xmlns:a14="http://schemas.microsoft.com/office/drawing/2010/main" xmlns="" w="9525">
                 <a:solidFill>
                   <a:schemeClr val="tx1"/>
                 </a:solidFill>
@@ -3823,7 +3808,7 @@
               </a14:hiddenLine>
             </a:ext>
             <a:ext uri="{AF507438-7753-43E0-B8FC-AC1667EBCBE1}">
-              <a14:hiddenEffects xmlns:a14="http://schemas.microsoft.com/office/drawing/2010/main">
+              <a14:hiddenEffects xmlns:a14="http://schemas.microsoft.com/office/drawing/2010/main" xmlns="">
                 <a:effectLst>
                   <a:outerShdw dist="35921" dir="2700000" algn="ctr" rotWithShape="0">
                     <a:schemeClr val="bg2"/>
@@ -3846,7 +3831,7 @@
           <a:blip r:embed="rId5">
             <a:extLst>
               <a:ext uri="{28A0092B-C50C-407E-A947-70E740481C1C}">
-                <a14:useLocalDpi xmlns:a14="http://schemas.microsoft.com/office/drawing/2010/main" val="0"/>
+                <a14:useLocalDpi xmlns:a14="http://schemas.microsoft.com/office/drawing/2010/main" xmlns="" val="0"/>
               </a:ext>
             </a:extLst>
           </a:blip>
@@ -3870,14 +3855,14 @@
           <a:effectLst/>
           <a:extLst>
             <a:ext uri="{909E8E84-426E-40DD-AFC4-6F175D3DCCD1}">
-              <a14:hiddenFill xmlns:a14="http://schemas.microsoft.com/office/drawing/2010/main">
+              <a14:hiddenFill xmlns:a14="http://schemas.microsoft.com/office/drawing/2010/main" xmlns="">
                 <a:solidFill>
                   <a:schemeClr val="accent1"/>
                 </a:solidFill>
               </a14:hiddenFill>
             </a:ext>
             <a:ext uri="{91240B29-F687-4F45-9708-019B960494DF}">
-              <a14:hiddenLine xmlns:a14="http://schemas.microsoft.com/office/drawing/2010/main" w="9525">
+              <a14:hiddenLine xmlns:a14="http://schemas.microsoft.com/office/drawing/2010/main" xmlns="" w="9525">
                 <a:solidFill>
                   <a:schemeClr val="tx1"/>
                 </a:solidFill>
@@ -3887,7 +3872,7 @@
               </a14:hiddenLine>
             </a:ext>
             <a:ext uri="{AF507438-7753-43E0-B8FC-AC1667EBCBE1}">
-              <a14:hiddenEffects xmlns:a14="http://schemas.microsoft.com/office/drawing/2010/main">
+              <a14:hiddenEffects xmlns:a14="http://schemas.microsoft.com/office/drawing/2010/main" xmlns="">
                 <a:effectLst>
                   <a:outerShdw dist="35921" dir="2700000" algn="ctr" rotWithShape="0">
                     <a:schemeClr val="bg2"/>
@@ -3910,7 +3895,7 @@
           <a:blip r:embed="rId6" cstate="print">
             <a:extLst>
               <a:ext uri="{28A0092B-C50C-407E-A947-70E740481C1C}">
-                <a14:useLocalDpi xmlns:a14="http://schemas.microsoft.com/office/drawing/2010/main" val="0"/>
+                <a14:useLocalDpi xmlns:a14="http://schemas.microsoft.com/office/drawing/2010/main" xmlns="" val="0"/>
               </a:ext>
             </a:extLst>
           </a:blip>
@@ -3930,7 +3915,7 @@
           <a:noFill/>
           <a:extLst>
             <a:ext uri="{909E8E84-426E-40DD-AFC4-6F175D3DCCD1}">
-              <a14:hiddenFill xmlns:a14="http://schemas.microsoft.com/office/drawing/2010/main">
+              <a14:hiddenFill xmlns:a14="http://schemas.microsoft.com/office/drawing/2010/main" xmlns="">
                 <a:solidFill>
                   <a:srgbClr val="FFFFFF"/>
                 </a:solidFill>
@@ -3951,7 +3936,7 @@
           <a:blip r:embed="rId7">
             <a:extLst>
               <a:ext uri="{28A0092B-C50C-407E-A947-70E740481C1C}">
-                <a14:useLocalDpi xmlns:a14="http://schemas.microsoft.com/office/drawing/2010/main" val="0"/>
+                <a14:useLocalDpi xmlns:a14="http://schemas.microsoft.com/office/drawing/2010/main" xmlns="" val="0"/>
               </a:ext>
             </a:extLst>
           </a:blip>
@@ -3975,14 +3960,14 @@
           <a:effectLst/>
           <a:extLst>
             <a:ext uri="{909E8E84-426E-40DD-AFC4-6F175D3DCCD1}">
-              <a14:hiddenFill xmlns:a14="http://schemas.microsoft.com/office/drawing/2010/main">
+              <a14:hiddenFill xmlns:a14="http://schemas.microsoft.com/office/drawing/2010/main" xmlns="">
                 <a:solidFill>
                   <a:schemeClr val="accent1"/>
                 </a:solidFill>
               </a14:hiddenFill>
             </a:ext>
             <a:ext uri="{91240B29-F687-4F45-9708-019B960494DF}">
-              <a14:hiddenLine xmlns:a14="http://schemas.microsoft.com/office/drawing/2010/main" w="9525">
+              <a14:hiddenLine xmlns:a14="http://schemas.microsoft.com/office/drawing/2010/main" xmlns="" w="9525">
                 <a:solidFill>
                   <a:schemeClr val="tx1"/>
                 </a:solidFill>
@@ -3992,7 +3977,7 @@
               </a14:hiddenLine>
             </a:ext>
             <a:ext uri="{AF507438-7753-43E0-B8FC-AC1667EBCBE1}">
-              <a14:hiddenEffects xmlns:a14="http://schemas.microsoft.com/office/drawing/2010/main">
+              <a14:hiddenEffects xmlns:a14="http://schemas.microsoft.com/office/drawing/2010/main" xmlns="">
                 <a:effectLst>
                   <a:outerShdw dist="35921" dir="2700000" algn="ctr" rotWithShape="0">
                     <a:schemeClr val="bg2"/>
@@ -4006,7 +3991,7 @@
     </p:spTree>
     <p:extLst>
       <p:ext uri="{BB962C8B-B14F-4D97-AF65-F5344CB8AC3E}">
-        <p14:creationId xmlns:p14="http://schemas.microsoft.com/office/powerpoint/2010/main" val="3109469233"/>
+        <p14:creationId xmlns:p14="http://schemas.microsoft.com/office/powerpoint/2010/main" xmlns="" val="3109469233"/>
       </p:ext>
     </p:extLst>
   </p:cSld>
@@ -4052,7 +4037,7 @@
           <a:blip r:embed="rId2">
             <a:extLst>
               <a:ext uri="{28A0092B-C50C-407E-A947-70E740481C1C}">
-                <a14:useLocalDpi xmlns:a14="http://schemas.microsoft.com/office/drawing/2010/main" val="0"/>
+                <a14:useLocalDpi xmlns:a14="http://schemas.microsoft.com/office/drawing/2010/main" xmlns="" val="0"/>
               </a:ext>
             </a:extLst>
           </a:blip>
@@ -4072,7 +4057,7 @@
           <a:noFill/>
           <a:extLst>
             <a:ext uri="{909E8E84-426E-40DD-AFC4-6F175D3DCCD1}">
-              <a14:hiddenFill xmlns:a14="http://schemas.microsoft.com/office/drawing/2010/main">
+              <a14:hiddenFill xmlns:a14="http://schemas.microsoft.com/office/drawing/2010/main" xmlns="">
                 <a:solidFill>
                   <a:srgbClr val="FFFFFF"/>
                 </a:solidFill>
@@ -4107,19 +4092,7 @@
               <a:rPr lang="en-US" sz="3200" dirty="0" smtClean="0">
                 <a:latin typeface="Dosis" pitchFamily="50" charset="0"/>
               </a:rPr>
-              <a:t>Less opportunity to</a:t>
-            </a:r>
-            <a:r>
-              <a:rPr lang="en-US" sz="3200" dirty="0" smtClean="0">
-                <a:latin typeface="Dosis" pitchFamily="50" charset="0"/>
-              </a:rPr>
-              <a:t>, Showcase </a:t>
-            </a:r>
-            <a:r>
-              <a:rPr lang="en-US" sz="3200" dirty="0" smtClean="0">
-                <a:latin typeface="Dosis" pitchFamily="50" charset="0"/>
-              </a:rPr>
-              <a:t>talent!</a:t>
+              <a:t>Less opportunity to, Showcase talent!</a:t>
             </a:r>
             <a:endParaRPr lang="en-IN" sz="3200" dirty="0">
               <a:latin typeface="Dosis" pitchFamily="50" charset="0"/>
@@ -4130,7 +4103,7 @@
     </p:spTree>
     <p:extLst>
       <p:ext uri="{BB962C8B-B14F-4D97-AF65-F5344CB8AC3E}">
-        <p14:creationId xmlns:p14="http://schemas.microsoft.com/office/powerpoint/2010/main" val="217411455"/>
+        <p14:creationId xmlns:p14="http://schemas.microsoft.com/office/powerpoint/2010/main" xmlns="" val="217411455"/>
       </p:ext>
     </p:extLst>
   </p:cSld>
@@ -4176,7 +4149,7 @@
           <a:blip r:embed="rId2">
             <a:extLst>
               <a:ext uri="{28A0092B-C50C-407E-A947-70E740481C1C}">
-                <a14:useLocalDpi xmlns:a14="http://schemas.microsoft.com/office/drawing/2010/main" val="0"/>
+                <a14:useLocalDpi xmlns:a14="http://schemas.microsoft.com/office/drawing/2010/main" xmlns="" val="0"/>
               </a:ext>
             </a:extLst>
           </a:blip>
@@ -4196,7 +4169,7 @@
           <a:noFill/>
           <a:extLst>
             <a:ext uri="{909E8E84-426E-40DD-AFC4-6F175D3DCCD1}">
-              <a14:hiddenFill xmlns:a14="http://schemas.microsoft.com/office/drawing/2010/main">
+              <a14:hiddenFill xmlns:a14="http://schemas.microsoft.com/office/drawing/2010/main" xmlns="">
                 <a:solidFill>
                   <a:srgbClr val="FFFFFF"/>
                 </a:solidFill>
@@ -4242,7 +4215,7 @@
     </p:spTree>
     <p:extLst>
       <p:ext uri="{BB962C8B-B14F-4D97-AF65-F5344CB8AC3E}">
-        <p14:creationId xmlns:p14="http://schemas.microsoft.com/office/powerpoint/2010/main" val="143002143"/>
+        <p14:creationId xmlns:p14="http://schemas.microsoft.com/office/powerpoint/2010/main" xmlns="" val="143002143"/>
       </p:ext>
     </p:extLst>
   </p:cSld>
@@ -4567,7 +4540,7 @@
     </p:spTree>
     <p:extLst>
       <p:ext uri="{BB962C8B-B14F-4D97-AF65-F5344CB8AC3E}">
-        <p14:creationId xmlns:p14="http://schemas.microsoft.com/office/powerpoint/2010/main" val="1816932983"/>
+        <p14:creationId xmlns:p14="http://schemas.microsoft.com/office/powerpoint/2010/main" xmlns="" val="1816932983"/>
       </p:ext>
     </p:extLst>
   </p:cSld>
@@ -4613,7 +4586,7 @@
           <a:blip r:embed="rId2">
             <a:extLst>
               <a:ext uri="{28A0092B-C50C-407E-A947-70E740481C1C}">
-                <a14:useLocalDpi xmlns:a14="http://schemas.microsoft.com/office/drawing/2010/main" val="0"/>
+                <a14:useLocalDpi xmlns:a14="http://schemas.microsoft.com/office/drawing/2010/main" xmlns="" val="0"/>
               </a:ext>
             </a:extLst>
           </a:blip>
@@ -4633,7 +4606,7 @@
           <a:noFill/>
           <a:extLst>
             <a:ext uri="{909E8E84-426E-40DD-AFC4-6F175D3DCCD1}">
-              <a14:hiddenFill xmlns:a14="http://schemas.microsoft.com/office/drawing/2010/main">
+              <a14:hiddenFill xmlns:a14="http://schemas.microsoft.com/office/drawing/2010/main" xmlns="">
                 <a:solidFill>
                   <a:srgbClr val="FFFFFF"/>
                 </a:solidFill>
@@ -4714,7 +4687,7 @@
           <a:blip r:embed="rId4">
             <a:extLst>
               <a:ext uri="{28A0092B-C50C-407E-A947-70E740481C1C}">
-                <a14:useLocalDpi xmlns:a14="http://schemas.microsoft.com/office/drawing/2010/main" val="0"/>
+                <a14:useLocalDpi xmlns:a14="http://schemas.microsoft.com/office/drawing/2010/main" xmlns="" val="0"/>
               </a:ext>
             </a:extLst>
           </a:blip>
@@ -4734,7 +4707,7 @@
           <a:noFill/>
           <a:extLst>
             <a:ext uri="{909E8E84-426E-40DD-AFC4-6F175D3DCCD1}">
-              <a14:hiddenFill xmlns:a14="http://schemas.microsoft.com/office/drawing/2010/main">
+              <a14:hiddenFill xmlns:a14="http://schemas.microsoft.com/office/drawing/2010/main" xmlns="">
                 <a:solidFill>
                   <a:srgbClr val="FFFFFF"/>
                 </a:solidFill>
@@ -4790,7 +4763,7 @@
           <a:blip r:embed="rId5">
             <a:extLst>
               <a:ext uri="{28A0092B-C50C-407E-A947-70E740481C1C}">
-                <a14:useLocalDpi xmlns:a14="http://schemas.microsoft.com/office/drawing/2010/main" val="0"/>
+                <a14:useLocalDpi xmlns:a14="http://schemas.microsoft.com/office/drawing/2010/main" xmlns="" val="0"/>
               </a:ext>
             </a:extLst>
           </a:blip>
@@ -4810,7 +4783,7 @@
           <a:noFill/>
           <a:extLst>
             <a:ext uri="{909E8E84-426E-40DD-AFC4-6F175D3DCCD1}">
-              <a14:hiddenFill xmlns:a14="http://schemas.microsoft.com/office/drawing/2010/main">
+              <a14:hiddenFill xmlns:a14="http://schemas.microsoft.com/office/drawing/2010/main" xmlns="">
                 <a:solidFill>
                   <a:srgbClr val="FFFFFF"/>
                 </a:solidFill>
@@ -5028,7 +5001,7 @@
     </p:spTree>
     <p:extLst>
       <p:ext uri="{BB962C8B-B14F-4D97-AF65-F5344CB8AC3E}">
-        <p14:creationId xmlns:p14="http://schemas.microsoft.com/office/powerpoint/2010/main" val="3730583800"/>
+        <p14:creationId xmlns:p14="http://schemas.microsoft.com/office/powerpoint/2010/main" xmlns="" val="3730583800"/>
       </p:ext>
     </p:extLst>
   </p:cSld>
@@ -5259,7 +5232,7 @@
     </p:spTree>
     <p:extLst>
       <p:ext uri="{BB962C8B-B14F-4D97-AF65-F5344CB8AC3E}">
-        <p14:creationId xmlns:p14="http://schemas.microsoft.com/office/powerpoint/2010/main" val="2732047189"/>
+        <p14:creationId xmlns:p14="http://schemas.microsoft.com/office/powerpoint/2010/main" xmlns="" val="2732047189"/>
       </p:ext>
     </p:extLst>
   </p:cSld>
@@ -5365,7 +5338,7 @@
           <a:blip r:embed="rId2" cstate="print">
             <a:extLst>
               <a:ext uri="{28A0092B-C50C-407E-A947-70E740481C1C}">
-                <a14:useLocalDpi xmlns:a14="http://schemas.microsoft.com/office/drawing/2010/main" val="0"/>
+                <a14:useLocalDpi xmlns:a14="http://schemas.microsoft.com/office/drawing/2010/main" xmlns="" val="0"/>
               </a:ext>
             </a:extLst>
           </a:blip>
@@ -5385,7 +5358,7 @@
           <a:noFill/>
           <a:extLst>
             <a:ext uri="{909E8E84-426E-40DD-AFC4-6F175D3DCCD1}">
-              <a14:hiddenFill xmlns:a14="http://schemas.microsoft.com/office/drawing/2010/main">
+              <a14:hiddenFill xmlns:a14="http://schemas.microsoft.com/office/drawing/2010/main" xmlns="">
                 <a:solidFill>
                   <a:srgbClr val="FFFFFF"/>
                 </a:solidFill>
@@ -5406,7 +5379,7 @@
           <a:blip r:embed="rId3">
             <a:extLst>
               <a:ext uri="{28A0092B-C50C-407E-A947-70E740481C1C}">
-                <a14:useLocalDpi xmlns:a14="http://schemas.microsoft.com/office/drawing/2010/main" val="0"/>
+                <a14:useLocalDpi xmlns:a14="http://schemas.microsoft.com/office/drawing/2010/main" xmlns="" val="0"/>
               </a:ext>
             </a:extLst>
           </a:blip>
@@ -5426,7 +5399,7 @@
           <a:noFill/>
           <a:extLst>
             <a:ext uri="{909E8E84-426E-40DD-AFC4-6F175D3DCCD1}">
-              <a14:hiddenFill xmlns:a14="http://schemas.microsoft.com/office/drawing/2010/main">
+              <a14:hiddenFill xmlns:a14="http://schemas.microsoft.com/office/drawing/2010/main" xmlns="">
                 <a:solidFill>
                   <a:srgbClr val="FFFFFF"/>
                 </a:solidFill>
@@ -5447,7 +5420,7 @@
           <a:blip r:embed="rId4" cstate="print">
             <a:extLst>
               <a:ext uri="{28A0092B-C50C-407E-A947-70E740481C1C}">
-                <a14:useLocalDpi xmlns:a14="http://schemas.microsoft.com/office/drawing/2010/main" val="0"/>
+                <a14:useLocalDpi xmlns:a14="http://schemas.microsoft.com/office/drawing/2010/main" xmlns="" val="0"/>
               </a:ext>
             </a:extLst>
           </a:blip>
@@ -5467,7 +5440,7 @@
           <a:noFill/>
           <a:extLst>
             <a:ext uri="{909E8E84-426E-40DD-AFC4-6F175D3DCCD1}">
-              <a14:hiddenFill xmlns:a14="http://schemas.microsoft.com/office/drawing/2010/main">
+              <a14:hiddenFill xmlns:a14="http://schemas.microsoft.com/office/drawing/2010/main" xmlns="">
                 <a:solidFill>
                   <a:srgbClr val="FFFFFF"/>
                 </a:solidFill>
@@ -5488,7 +5461,7 @@
           <a:blip r:embed="rId5" cstate="print">
             <a:extLst>
               <a:ext uri="{28A0092B-C50C-407E-A947-70E740481C1C}">
-                <a14:useLocalDpi xmlns:a14="http://schemas.microsoft.com/office/drawing/2010/main" val="0"/>
+                <a14:useLocalDpi xmlns:a14="http://schemas.microsoft.com/office/drawing/2010/main" xmlns="" val="0"/>
               </a:ext>
             </a:extLst>
           </a:blip>
@@ -5508,7 +5481,7 @@
           <a:noFill/>
           <a:extLst>
             <a:ext uri="{909E8E84-426E-40DD-AFC4-6F175D3DCCD1}">
-              <a14:hiddenFill xmlns:a14="http://schemas.microsoft.com/office/drawing/2010/main">
+              <a14:hiddenFill xmlns:a14="http://schemas.microsoft.com/office/drawing/2010/main" xmlns="">
                 <a:solidFill>
                   <a:srgbClr val="FFFFFF"/>
                 </a:solidFill>
@@ -5529,7 +5502,7 @@
           <a:blip r:embed="rId6">
             <a:extLst>
               <a:ext uri="{28A0092B-C50C-407E-A947-70E740481C1C}">
-                <a14:useLocalDpi xmlns:a14="http://schemas.microsoft.com/office/drawing/2010/main" val="0"/>
+                <a14:useLocalDpi xmlns:a14="http://schemas.microsoft.com/office/drawing/2010/main" xmlns="" val="0"/>
               </a:ext>
             </a:extLst>
           </a:blip>
@@ -5549,7 +5522,7 @@
           <a:noFill/>
           <a:extLst>
             <a:ext uri="{909E8E84-426E-40DD-AFC4-6F175D3DCCD1}">
-              <a14:hiddenFill xmlns:a14="http://schemas.microsoft.com/office/drawing/2010/main">
+              <a14:hiddenFill xmlns:a14="http://schemas.microsoft.com/office/drawing/2010/main" xmlns="">
                 <a:solidFill>
                   <a:srgbClr val="FFFFFF"/>
                 </a:solidFill>
@@ -5570,7 +5543,7 @@
           <a:blip r:embed="rId7" cstate="print">
             <a:extLst>
               <a:ext uri="{28A0092B-C50C-407E-A947-70E740481C1C}">
-                <a14:useLocalDpi xmlns:a14="http://schemas.microsoft.com/office/drawing/2010/main" val="0"/>
+                <a14:useLocalDpi xmlns:a14="http://schemas.microsoft.com/office/drawing/2010/main" xmlns="" val="0"/>
               </a:ext>
             </a:extLst>
           </a:blip>
@@ -5590,7 +5563,7 @@
           <a:noFill/>
           <a:extLst>
             <a:ext uri="{909E8E84-426E-40DD-AFC4-6F175D3DCCD1}">
-              <a14:hiddenFill xmlns:a14="http://schemas.microsoft.com/office/drawing/2010/main">
+              <a14:hiddenFill xmlns:a14="http://schemas.microsoft.com/office/drawing/2010/main" xmlns="">
                 <a:solidFill>
                   <a:srgbClr val="FFFFFF"/>
                 </a:solidFill>
@@ -5611,7 +5584,7 @@
           <a:blip r:embed="rId8" cstate="print">
             <a:extLst>
               <a:ext uri="{28A0092B-C50C-407E-A947-70E740481C1C}">
-                <a14:useLocalDpi xmlns:a14="http://schemas.microsoft.com/office/drawing/2010/main" val="0"/>
+                <a14:useLocalDpi xmlns:a14="http://schemas.microsoft.com/office/drawing/2010/main" xmlns="" val="0"/>
               </a:ext>
             </a:extLst>
           </a:blip>
@@ -5631,7 +5604,7 @@
           <a:noFill/>
           <a:extLst>
             <a:ext uri="{909E8E84-426E-40DD-AFC4-6F175D3DCCD1}">
-              <a14:hiddenFill xmlns:a14="http://schemas.microsoft.com/office/drawing/2010/main">
+              <a14:hiddenFill xmlns:a14="http://schemas.microsoft.com/office/drawing/2010/main" xmlns="">
                 <a:solidFill>
                   <a:srgbClr val="FFFFFF"/>
                 </a:solidFill>
@@ -5683,7 +5656,7 @@
           <a:blip r:embed="rId9">
             <a:extLst>
               <a:ext uri="{28A0092B-C50C-407E-A947-70E740481C1C}">
-                <a14:useLocalDpi xmlns:a14="http://schemas.microsoft.com/office/drawing/2010/main" val="0"/>
+                <a14:useLocalDpi xmlns:a14="http://schemas.microsoft.com/office/drawing/2010/main" xmlns="" val="0"/>
               </a:ext>
             </a:extLst>
           </a:blip>
@@ -5703,7 +5676,7 @@
           <a:noFill/>
           <a:extLst>
             <a:ext uri="{909E8E84-426E-40DD-AFC4-6F175D3DCCD1}">
-              <a14:hiddenFill xmlns:a14="http://schemas.microsoft.com/office/drawing/2010/main">
+              <a14:hiddenFill xmlns:a14="http://schemas.microsoft.com/office/drawing/2010/main" xmlns="">
                 <a:solidFill>
                   <a:srgbClr val="FFFFFF"/>
                 </a:solidFill>
@@ -5715,7 +5688,7 @@
     </p:spTree>
     <p:extLst>
       <p:ext uri="{BB962C8B-B14F-4D97-AF65-F5344CB8AC3E}">
-        <p14:creationId xmlns:p14="http://schemas.microsoft.com/office/powerpoint/2010/main" val="887269471"/>
+        <p14:creationId xmlns:p14="http://schemas.microsoft.com/office/powerpoint/2010/main" xmlns="" val="887269471"/>
       </p:ext>
     </p:extLst>
   </p:cSld>

</xml_diff>